<commit_message>
change some of color text
</commit_message>
<xml_diff>
--- a/docs/Test.pptx
+++ b/docs/Test.pptx
@@ -107,6 +107,11 @@
       </a:defRPr>
     </a:lvl9pPr>
   </p:defaultTextStyle>
+  <p:extLst>
+    <p:ext uri="{EFAFB233-063F-42B5-8137-9DF3F51BA10A}">
+      <p15:sldGuideLst xmlns:p15="http://schemas.microsoft.com/office/powerpoint/2012/main"/>
+    </p:ext>
+  </p:extLst>
 </p:presentation>
 </file>
 
@@ -257,7 +262,7 @@
           <a:p>
             <a:fld id="{ED0BEE5B-8642-0340-819D-FF7F3C24362F}" type="datetimeFigureOut">
               <a:rPr lang="en-US" smtClean="0"/>
-              <a:t>5/29/21</a:t>
+              <a:t>30-May-21</a:t>
             </a:fld>
             <a:endParaRPr lang="en-US"/>
           </a:p>
@@ -455,7 +460,7 @@
           <a:p>
             <a:fld id="{ED0BEE5B-8642-0340-819D-FF7F3C24362F}" type="datetimeFigureOut">
               <a:rPr lang="en-US" smtClean="0"/>
-              <a:t>5/29/21</a:t>
+              <a:t>30-May-21</a:t>
             </a:fld>
             <a:endParaRPr lang="en-US"/>
           </a:p>
@@ -663,7 +668,7 @@
           <a:p>
             <a:fld id="{ED0BEE5B-8642-0340-819D-FF7F3C24362F}" type="datetimeFigureOut">
               <a:rPr lang="en-US" smtClean="0"/>
-              <a:t>5/29/21</a:t>
+              <a:t>30-May-21</a:t>
             </a:fld>
             <a:endParaRPr lang="en-US"/>
           </a:p>
@@ -861,7 +866,7 @@
           <a:p>
             <a:fld id="{ED0BEE5B-8642-0340-819D-FF7F3C24362F}" type="datetimeFigureOut">
               <a:rPr lang="en-US" smtClean="0"/>
-              <a:t>5/29/21</a:t>
+              <a:t>30-May-21</a:t>
             </a:fld>
             <a:endParaRPr lang="en-US"/>
           </a:p>
@@ -1136,7 +1141,7 @@
           <a:p>
             <a:fld id="{ED0BEE5B-8642-0340-819D-FF7F3C24362F}" type="datetimeFigureOut">
               <a:rPr lang="en-US" smtClean="0"/>
-              <a:t>5/29/21</a:t>
+              <a:t>30-May-21</a:t>
             </a:fld>
             <a:endParaRPr lang="en-US"/>
           </a:p>
@@ -1401,7 +1406,7 @@
           <a:p>
             <a:fld id="{ED0BEE5B-8642-0340-819D-FF7F3C24362F}" type="datetimeFigureOut">
               <a:rPr lang="en-US" smtClean="0"/>
-              <a:t>5/29/21</a:t>
+              <a:t>30-May-21</a:t>
             </a:fld>
             <a:endParaRPr lang="en-US"/>
           </a:p>
@@ -1813,7 +1818,7 @@
           <a:p>
             <a:fld id="{ED0BEE5B-8642-0340-819D-FF7F3C24362F}" type="datetimeFigureOut">
               <a:rPr lang="en-US" smtClean="0"/>
-              <a:t>5/29/21</a:t>
+              <a:t>30-May-21</a:t>
             </a:fld>
             <a:endParaRPr lang="en-US"/>
           </a:p>
@@ -1954,7 +1959,7 @@
           <a:p>
             <a:fld id="{ED0BEE5B-8642-0340-819D-FF7F3C24362F}" type="datetimeFigureOut">
               <a:rPr lang="en-US" smtClean="0"/>
-              <a:t>5/29/21</a:t>
+              <a:t>30-May-21</a:t>
             </a:fld>
             <a:endParaRPr lang="en-US"/>
           </a:p>
@@ -2067,7 +2072,7 @@
           <a:p>
             <a:fld id="{ED0BEE5B-8642-0340-819D-FF7F3C24362F}" type="datetimeFigureOut">
               <a:rPr lang="en-US" smtClean="0"/>
-              <a:t>5/29/21</a:t>
+              <a:t>30-May-21</a:t>
             </a:fld>
             <a:endParaRPr lang="en-US"/>
           </a:p>
@@ -2378,7 +2383,7 @@
           <a:p>
             <a:fld id="{ED0BEE5B-8642-0340-819D-FF7F3C24362F}" type="datetimeFigureOut">
               <a:rPr lang="en-US" smtClean="0"/>
-              <a:t>5/29/21</a:t>
+              <a:t>30-May-21</a:t>
             </a:fld>
             <a:endParaRPr lang="en-US"/>
           </a:p>
@@ -2666,7 +2671,7 @@
           <a:p>
             <a:fld id="{ED0BEE5B-8642-0340-819D-FF7F3C24362F}" type="datetimeFigureOut">
               <a:rPr lang="en-US" smtClean="0"/>
-              <a:t>5/29/21</a:t>
+              <a:t>30-May-21</a:t>
             </a:fld>
             <a:endParaRPr lang="en-US"/>
           </a:p>
@@ -2907,7 +2912,7 @@
           <a:p>
             <a:fld id="{ED0BEE5B-8642-0340-819D-FF7F3C24362F}" type="datetimeFigureOut">
               <a:rPr lang="en-US" smtClean="0"/>
-              <a:t>5/29/21</a:t>
+              <a:t>30-May-21</a:t>
             </a:fld>
             <a:endParaRPr lang="en-US"/>
           </a:p>
@@ -3454,19 +3459,39 @@
           <a:lstStyle/>
           <a:p>
             <a:r>
+              <a:rPr lang="en-US" dirty="0">
+                <a:solidFill>
+                  <a:srgbClr val="FF0000"/>
+                </a:solidFill>
+              </a:rPr>
+              <a:t>Project’s name is </a:t>
+            </a:r>
+            <a:r>
+              <a:rPr lang="en-US" dirty="0" err="1">
+                <a:solidFill>
+                  <a:srgbClr val="FF0000"/>
+                </a:solidFill>
+              </a:rPr>
+              <a:t>HouseApp</a:t>
+            </a:r>
+            <a:endParaRPr lang="en-US" dirty="0">
+              <a:solidFill>
+                <a:srgbClr val="FF0000"/>
+              </a:solidFill>
+            </a:endParaRPr>
+          </a:p>
+          <a:p>
+            <a:r>
+              <a:rPr lang="en-US" dirty="0">
+                <a:solidFill>
+                  <a:srgbClr val="FF0000"/>
+                </a:solidFill>
+              </a:rPr>
+              <a:t>Languages and frameworks</a:t>
+            </a:r>
+            <a:r>
               <a:rPr lang="en-US" dirty="0"/>
-              <a:t>Project’s name is </a:t>
-            </a:r>
-            <a:r>
-              <a:rPr lang="en-US" dirty="0" err="1"/>
-              <a:t>HouseApp</a:t>
-            </a:r>
-            <a:endParaRPr lang="en-US" dirty="0"/>
-          </a:p>
-          <a:p>
-            <a:r>
-              <a:rPr lang="en-US" dirty="0"/>
-              <a:t>Languages and frameworks:</a:t>
+              <a:t>:</a:t>
             </a:r>
           </a:p>
           <a:p>
@@ -3556,10 +3581,9 @@
               <a:t>js</a:t>
             </a:r>
             <a:r>
-              <a:rPr lang="en-US"/>
+              <a:rPr lang="en-US" dirty="0"/>
               <a:t>.</a:t>
             </a:r>
-            <a:endParaRPr lang="en-US" dirty="0"/>
           </a:p>
         </p:txBody>
       </p:sp>

</xml_diff>